<commit_message>
flask update and delete
</commit_message>
<xml_diff>
--- a/Bootcamp/flask/flask.pptx
+++ b/Bootcamp/flask/flask.pptx
@@ -5,7 +5,7 @@
     <p:sldMasterId id="2147483648" r:id="rId4"/>
   </p:sldMasterIdLst>
   <p:notesMasterIdLst>
-    <p:notesMasterId r:id="rId17"/>
+    <p:notesMasterId r:id="rId18"/>
   </p:notesMasterIdLst>
   <p:sldIdLst>
     <p:sldId id="282" r:id="rId5"/>
@@ -20,6 +20,7 @@
     <p:sldId id="418" r:id="rId14"/>
     <p:sldId id="419" r:id="rId15"/>
     <p:sldId id="378" r:id="rId16"/>
+    <p:sldId id="420" r:id="rId17"/>
   </p:sldIdLst>
   <p:sldSz cx="12192000" cy="6858000"/>
   <p:notesSz cx="6858000" cy="9144000"/>
@@ -139,6 +140,7 @@
             <p14:sldId id="418"/>
             <p14:sldId id="419"/>
             <p14:sldId id="378"/>
+            <p14:sldId id="420"/>
           </p14:sldIdLst>
         </p14:section>
       </p14:sectionLst>
@@ -826,6 +828,114 @@
     <p:extLst>
       <p:ext uri="{BB962C8B-B14F-4D97-AF65-F5344CB8AC3E}">
         <p14:creationId xmlns:p14="http://schemas.microsoft.com/office/powerpoint/2010/main" val="978507786"/>
+      </p:ext>
+    </p:extLst>
+  </p:cSld>
+  <p:clrMapOvr>
+    <a:masterClrMapping/>
+  </p:clrMapOvr>
+</p:notes>
+</file>
+
+<file path=ppt/notesSlides/notesSlide12.xml><?xml version="1.0" encoding="utf-8"?>
+<p:notes xmlns:a="http://schemas.openxmlformats.org/drawingml/2006/main" xmlns:r="http://schemas.openxmlformats.org/officeDocument/2006/relationships" xmlns:p="http://schemas.openxmlformats.org/presentationml/2006/main">
+  <p:cSld>
+    <p:spTree>
+      <p:nvGrpSpPr>
+        <p:cNvPr id="1" name="">
+          <a:extLst>
+            <a:ext uri="{FF2B5EF4-FFF2-40B4-BE49-F238E27FC236}">
+              <a16:creationId xmlns:a16="http://schemas.microsoft.com/office/drawing/2014/main" id="{92ED6293-CD00-CE0F-29E0-057637E878FF}"/>
+            </a:ext>
+          </a:extLst>
+        </p:cNvPr>
+        <p:cNvGrpSpPr/>
+        <p:nvPr/>
+      </p:nvGrpSpPr>
+      <p:grpSpPr>
+        <a:xfrm>
+          <a:off x="0" y="0"/>
+          <a:ext cx="0" cy="0"/>
+          <a:chOff x="0" y="0"/>
+          <a:chExt cx="0" cy="0"/>
+        </a:xfrm>
+      </p:grpSpPr>
+      <p:sp>
+        <p:nvSpPr>
+          <p:cNvPr id="2" name="Slide Image Placeholder 1">
+            <a:extLst>
+              <a:ext uri="{FF2B5EF4-FFF2-40B4-BE49-F238E27FC236}">
+                <a16:creationId xmlns:a16="http://schemas.microsoft.com/office/drawing/2014/main" id="{50C36EEE-62BC-2A8F-A641-790A2FEA39B0}"/>
+              </a:ext>
+            </a:extLst>
+          </p:cNvPr>
+          <p:cNvSpPr>
+            <a:spLocks noGrp="1" noRot="1" noChangeAspect="1"/>
+          </p:cNvSpPr>
+          <p:nvPr>
+            <p:ph type="sldImg"/>
+          </p:nvPr>
+        </p:nvSpPr>
+        <p:spPr/>
+      </p:sp>
+      <p:sp>
+        <p:nvSpPr>
+          <p:cNvPr id="3" name="Notes Placeholder 2">
+            <a:extLst>
+              <a:ext uri="{FF2B5EF4-FFF2-40B4-BE49-F238E27FC236}">
+                <a16:creationId xmlns:a16="http://schemas.microsoft.com/office/drawing/2014/main" id="{FDE35C08-BDDA-355C-9531-017563BA3C69}"/>
+              </a:ext>
+            </a:extLst>
+          </p:cNvPr>
+          <p:cNvSpPr>
+            <a:spLocks noGrp="1"/>
+          </p:cNvSpPr>
+          <p:nvPr>
+            <p:ph type="body" idx="1"/>
+          </p:nvPr>
+        </p:nvSpPr>
+        <p:spPr/>
+        <p:txBody>
+          <a:bodyPr/>
+          <a:lstStyle/>
+          <a:p>
+            <a:endParaRPr lang="hr-HR" dirty="0"/>
+          </a:p>
+        </p:txBody>
+      </p:sp>
+      <p:sp>
+        <p:nvSpPr>
+          <p:cNvPr id="4" name="Slide Number Placeholder 3">
+            <a:extLst>
+              <a:ext uri="{FF2B5EF4-FFF2-40B4-BE49-F238E27FC236}">
+                <a16:creationId xmlns:a16="http://schemas.microsoft.com/office/drawing/2014/main" id="{0108D25C-D1AA-608E-809C-CA34A9650DB6}"/>
+              </a:ext>
+            </a:extLst>
+          </p:cNvPr>
+          <p:cNvSpPr>
+            <a:spLocks noGrp="1"/>
+          </p:cNvSpPr>
+          <p:nvPr>
+            <p:ph type="sldNum" sz="quarter" idx="5"/>
+          </p:nvPr>
+        </p:nvSpPr>
+        <p:spPr/>
+        <p:txBody>
+          <a:bodyPr/>
+          <a:lstStyle/>
+          <a:p>
+            <a:fld id="{343B951A-A665-1949-AEDB-B62DC9BE7F13}" type="slidenum">
+              <a:rPr lang="en-US" smtClean="0"/>
+              <a:t>13</a:t>
+            </a:fld>
+            <a:endParaRPr lang="en-US"/>
+          </a:p>
+        </p:txBody>
+      </p:sp>
+    </p:spTree>
+    <p:extLst>
+      <p:ext uri="{BB962C8B-B14F-4D97-AF65-F5344CB8AC3E}">
+        <p14:creationId xmlns:p14="http://schemas.microsoft.com/office/powerpoint/2010/main" val="2872532536"/>
       </p:ext>
     </p:extLst>
   </p:cSld>
@@ -14529,6 +14639,1084 @@
     <p:extLst>
       <p:ext uri="{BB962C8B-B14F-4D97-AF65-F5344CB8AC3E}">
         <p14:creationId xmlns:p14="http://schemas.microsoft.com/office/powerpoint/2010/main" val="4076044860"/>
+      </p:ext>
+    </p:extLst>
+  </p:cSld>
+  <p:clrMapOvr>
+    <a:masterClrMapping/>
+  </p:clrMapOvr>
+</p:sld>
+</file>
+
+<file path=ppt/slides/slide13.xml><?xml version="1.0" encoding="utf-8"?>
+<p:sld xmlns:a="http://schemas.openxmlformats.org/drawingml/2006/main" xmlns:r="http://schemas.openxmlformats.org/officeDocument/2006/relationships" xmlns:p="http://schemas.openxmlformats.org/presentationml/2006/main">
+  <p:cSld>
+    <p:spTree>
+      <p:nvGrpSpPr>
+        <p:cNvPr id="1" name="">
+          <a:extLst>
+            <a:ext uri="{FF2B5EF4-FFF2-40B4-BE49-F238E27FC236}">
+              <a16:creationId xmlns:a16="http://schemas.microsoft.com/office/drawing/2014/main" id="{153ABA7F-8D57-6B00-F5DD-8120B23DCC0D}"/>
+            </a:ext>
+          </a:extLst>
+        </p:cNvPr>
+        <p:cNvGrpSpPr/>
+        <p:nvPr/>
+      </p:nvGrpSpPr>
+      <p:grpSpPr>
+        <a:xfrm>
+          <a:off x="0" y="0"/>
+          <a:ext cx="0" cy="0"/>
+          <a:chOff x="0" y="0"/>
+          <a:chExt cx="0" cy="0"/>
+        </a:xfrm>
+      </p:grpSpPr>
+      <p:sp>
+        <p:nvSpPr>
+          <p:cNvPr id="4" name="Title 1">
+            <a:extLst>
+              <a:ext uri="{FF2B5EF4-FFF2-40B4-BE49-F238E27FC236}">
+                <a16:creationId xmlns:a16="http://schemas.microsoft.com/office/drawing/2014/main" id="{D0A37CEB-7E86-3467-BF06-50E622CE1B48}"/>
+              </a:ext>
+            </a:extLst>
+          </p:cNvPr>
+          <p:cNvSpPr txBox="1">
+            <a:spLocks/>
+          </p:cNvSpPr>
+          <p:nvPr/>
+        </p:nvSpPr>
+        <p:spPr>
+          <a:xfrm>
+            <a:off x="990600" y="383056"/>
+            <a:ext cx="10515600" cy="853976"/>
+          </a:xfrm>
+          <a:prstGeom prst="rect">
+            <a:avLst/>
+          </a:prstGeom>
+        </p:spPr>
+        <p:txBody>
+          <a:bodyPr vert="horz" lIns="91440" tIns="45720" rIns="91440" bIns="45720" rtlCol="0" anchor="ctr">
+            <a:normAutofit/>
+          </a:bodyPr>
+          <a:lstStyle>
+            <a:lvl1pPr algn="l" defTabSz="914400" rtl="0" eaLnBrk="1" latinLnBrk="0" hangingPunct="1">
+              <a:lnSpc>
+                <a:spcPct val="90000"/>
+              </a:lnSpc>
+              <a:spcBef>
+                <a:spcPct val="0"/>
+              </a:spcBef>
+              <a:buNone/>
+              <a:defRPr sz="3600" b="1" i="0" kern="1200" cap="all" baseline="0">
+                <a:solidFill>
+                  <a:schemeClr val="tx2"/>
+                </a:solidFill>
+                <a:latin typeface="+mj-lt"/>
+                <a:ea typeface="Open Sans Semibold" panose="020B0606030504020204" pitchFamily="34" charset="0"/>
+                <a:cs typeface="Open Sans Semibold" panose="020B0606030504020204" pitchFamily="34" charset="0"/>
+              </a:defRPr>
+            </a:lvl1pPr>
+          </a:lstStyle>
+          <a:p>
+            <a:r>
+              <a:rPr lang="en-US" dirty="0"/>
+              <a:t>FLASK – UPDATE AND DELETE</a:t>
+            </a:r>
+            <a:endParaRPr lang="hr-HR" dirty="0"/>
+          </a:p>
+        </p:txBody>
+      </p:sp>
+      <p:sp>
+        <p:nvSpPr>
+          <p:cNvPr id="2" name="Content Placeholder 2">
+            <a:extLst>
+              <a:ext uri="{FF2B5EF4-FFF2-40B4-BE49-F238E27FC236}">
+                <a16:creationId xmlns:a16="http://schemas.microsoft.com/office/drawing/2014/main" id="{A0F9FF11-51B4-A181-2697-C8EAF80B833C}"/>
+              </a:ext>
+            </a:extLst>
+          </p:cNvPr>
+          <p:cNvSpPr txBox="1">
+            <a:spLocks/>
+          </p:cNvSpPr>
+          <p:nvPr/>
+        </p:nvSpPr>
+        <p:spPr>
+          <a:xfrm>
+            <a:off x="990600" y="1237032"/>
+            <a:ext cx="1974646" cy="369895"/>
+          </a:xfrm>
+          <a:prstGeom prst="rect">
+            <a:avLst/>
+          </a:prstGeom>
+        </p:spPr>
+        <p:txBody>
+          <a:bodyPr vert="horz" lIns="91440" tIns="45720" rIns="91440" bIns="45720" rtlCol="0">
+            <a:noAutofit/>
+          </a:bodyPr>
+          <a:lstStyle>
+            <a:lvl1pPr marL="368300" indent="-352425" algn="l" defTabSz="914400" rtl="0" eaLnBrk="1" latinLnBrk="0" hangingPunct="1">
+              <a:lnSpc>
+                <a:spcPct val="90000"/>
+              </a:lnSpc>
+              <a:spcBef>
+                <a:spcPts val="600"/>
+              </a:spcBef>
+              <a:spcAft>
+                <a:spcPts val="600"/>
+              </a:spcAft>
+              <a:buClr>
+                <a:schemeClr val="accent2"/>
+              </a:buClr>
+              <a:buFont typeface="Wingdings" pitchFamily="2" charset="2"/>
+              <a:buChar char="§"/>
+              <a:tabLst/>
+              <a:defRPr sz="2400" kern="1200">
+                <a:solidFill>
+                  <a:schemeClr val="tx1"/>
+                </a:solidFill>
+                <a:latin typeface="+mn-lt"/>
+                <a:ea typeface="Open Sans" panose="020B0606030504020204" pitchFamily="34" charset="0"/>
+                <a:cs typeface="Open Sans" panose="020B0606030504020204" pitchFamily="34" charset="0"/>
+              </a:defRPr>
+            </a:lvl1pPr>
+            <a:lvl2pPr marL="771525" indent="-274638" algn="l" defTabSz="914400" rtl="0" eaLnBrk="1" latinLnBrk="0" hangingPunct="1">
+              <a:lnSpc>
+                <a:spcPct val="90000"/>
+              </a:lnSpc>
+              <a:spcBef>
+                <a:spcPts val="600"/>
+              </a:spcBef>
+              <a:spcAft>
+                <a:spcPts val="600"/>
+              </a:spcAft>
+              <a:buClr>
+                <a:schemeClr val="accent2"/>
+              </a:buClr>
+              <a:buFont typeface="Wingdings" pitchFamily="2" charset="2"/>
+              <a:buChar char="§"/>
+              <a:tabLst/>
+              <a:defRPr sz="2200" kern="1200">
+                <a:solidFill>
+                  <a:schemeClr val="tx1"/>
+                </a:solidFill>
+                <a:latin typeface="+mn-lt"/>
+                <a:ea typeface="Open Sans" panose="020B0606030504020204" pitchFamily="34" charset="0"/>
+                <a:cs typeface="Open Sans" panose="020B0606030504020204" pitchFamily="34" charset="0"/>
+              </a:defRPr>
+            </a:lvl2pPr>
+            <a:lvl3pPr marL="1143000" indent="-228600" algn="l" defTabSz="914400" rtl="0" eaLnBrk="1" latinLnBrk="0" hangingPunct="1">
+              <a:lnSpc>
+                <a:spcPct val="90000"/>
+              </a:lnSpc>
+              <a:spcBef>
+                <a:spcPts val="600"/>
+              </a:spcBef>
+              <a:spcAft>
+                <a:spcPts val="600"/>
+              </a:spcAft>
+              <a:buClr>
+                <a:schemeClr val="accent2"/>
+              </a:buClr>
+              <a:buFont typeface="Wingdings" pitchFamily="2" charset="2"/>
+              <a:buChar char="§"/>
+              <a:defRPr sz="2000" kern="1200">
+                <a:solidFill>
+                  <a:schemeClr val="tx1"/>
+                </a:solidFill>
+                <a:latin typeface="+mn-lt"/>
+                <a:ea typeface="Open Sans" panose="020B0606030504020204" pitchFamily="34" charset="0"/>
+                <a:cs typeface="Open Sans" panose="020B0606030504020204" pitchFamily="34" charset="0"/>
+              </a:defRPr>
+            </a:lvl3pPr>
+            <a:lvl4pPr marL="1600200" indent="-228600" algn="l" defTabSz="914400" rtl="0" eaLnBrk="1" latinLnBrk="0" hangingPunct="1">
+              <a:lnSpc>
+                <a:spcPct val="90000"/>
+              </a:lnSpc>
+              <a:spcBef>
+                <a:spcPts val="600"/>
+              </a:spcBef>
+              <a:spcAft>
+                <a:spcPts val="600"/>
+              </a:spcAft>
+              <a:buClr>
+                <a:schemeClr val="accent2"/>
+              </a:buClr>
+              <a:buFont typeface="Wingdings" pitchFamily="2" charset="2"/>
+              <a:buChar char="§"/>
+              <a:defRPr sz="1800" kern="1200">
+                <a:solidFill>
+                  <a:schemeClr val="tx1"/>
+                </a:solidFill>
+                <a:latin typeface="+mn-lt"/>
+                <a:ea typeface="Open Sans" panose="020B0606030504020204" pitchFamily="34" charset="0"/>
+                <a:cs typeface="Open Sans" panose="020B0606030504020204" pitchFamily="34" charset="0"/>
+              </a:defRPr>
+            </a:lvl4pPr>
+            <a:lvl5pPr marL="1960563" indent="-225425" algn="l" defTabSz="914400" rtl="0" eaLnBrk="1" latinLnBrk="0" hangingPunct="1">
+              <a:lnSpc>
+                <a:spcPct val="90000"/>
+              </a:lnSpc>
+              <a:spcBef>
+                <a:spcPts val="600"/>
+              </a:spcBef>
+              <a:spcAft>
+                <a:spcPts val="600"/>
+              </a:spcAft>
+              <a:buClr>
+                <a:schemeClr val="accent2"/>
+              </a:buClr>
+              <a:buFont typeface="Wingdings" pitchFamily="2" charset="2"/>
+              <a:buChar char="§"/>
+              <a:tabLst/>
+              <a:defRPr sz="1600" kern="1200">
+                <a:solidFill>
+                  <a:schemeClr val="tx1"/>
+                </a:solidFill>
+                <a:latin typeface="+mn-lt"/>
+                <a:ea typeface="Open Sans" panose="020B0606030504020204" pitchFamily="34" charset="0"/>
+                <a:cs typeface="Open Sans" panose="020B0606030504020204" pitchFamily="34" charset="0"/>
+              </a:defRPr>
+            </a:lvl5pPr>
+            <a:lvl6pPr marL="2514600" indent="-228600" algn="l" defTabSz="914400" rtl="0" eaLnBrk="1" latinLnBrk="0" hangingPunct="1">
+              <a:lnSpc>
+                <a:spcPct val="90000"/>
+              </a:lnSpc>
+              <a:spcBef>
+                <a:spcPts val="500"/>
+              </a:spcBef>
+              <a:buFont typeface="Arial" panose="020B0604020202020204" pitchFamily="34" charset="0"/>
+              <a:buChar char="•"/>
+              <a:defRPr sz="1800" kern="1200">
+                <a:solidFill>
+                  <a:schemeClr val="tx1"/>
+                </a:solidFill>
+                <a:latin typeface="+mn-lt"/>
+                <a:ea typeface="+mn-ea"/>
+                <a:cs typeface="+mn-cs"/>
+              </a:defRPr>
+            </a:lvl6pPr>
+            <a:lvl7pPr marL="2971800" indent="-228600" algn="l" defTabSz="914400" rtl="0" eaLnBrk="1" latinLnBrk="0" hangingPunct="1">
+              <a:lnSpc>
+                <a:spcPct val="90000"/>
+              </a:lnSpc>
+              <a:spcBef>
+                <a:spcPts val="500"/>
+              </a:spcBef>
+              <a:buFont typeface="Arial" panose="020B0604020202020204" pitchFamily="34" charset="0"/>
+              <a:buChar char="•"/>
+              <a:defRPr sz="1800" kern="1200">
+                <a:solidFill>
+                  <a:schemeClr val="tx1"/>
+                </a:solidFill>
+                <a:latin typeface="+mn-lt"/>
+                <a:ea typeface="+mn-ea"/>
+                <a:cs typeface="+mn-cs"/>
+              </a:defRPr>
+            </a:lvl7pPr>
+            <a:lvl8pPr marL="3429000" indent="-228600" algn="l" defTabSz="914400" rtl="0" eaLnBrk="1" latinLnBrk="0" hangingPunct="1">
+              <a:lnSpc>
+                <a:spcPct val="90000"/>
+              </a:lnSpc>
+              <a:spcBef>
+                <a:spcPts val="500"/>
+              </a:spcBef>
+              <a:buFont typeface="Arial" panose="020B0604020202020204" pitchFamily="34" charset="0"/>
+              <a:buChar char="•"/>
+              <a:defRPr sz="1800" kern="1200">
+                <a:solidFill>
+                  <a:schemeClr val="tx1"/>
+                </a:solidFill>
+                <a:latin typeface="+mn-lt"/>
+                <a:ea typeface="+mn-ea"/>
+                <a:cs typeface="+mn-cs"/>
+              </a:defRPr>
+            </a:lvl8pPr>
+            <a:lvl9pPr marL="3886200" indent="-228600" algn="l" defTabSz="914400" rtl="0" eaLnBrk="1" latinLnBrk="0" hangingPunct="1">
+              <a:lnSpc>
+                <a:spcPct val="90000"/>
+              </a:lnSpc>
+              <a:spcBef>
+                <a:spcPts val="500"/>
+              </a:spcBef>
+              <a:buFont typeface="Arial" panose="020B0604020202020204" pitchFamily="34" charset="0"/>
+              <a:buChar char="•"/>
+              <a:defRPr sz="1800" kern="1200">
+                <a:solidFill>
+                  <a:schemeClr val="tx1"/>
+                </a:solidFill>
+                <a:latin typeface="+mn-lt"/>
+                <a:ea typeface="+mn-ea"/>
+                <a:cs typeface="+mn-cs"/>
+              </a:defRPr>
+            </a:lvl9pPr>
+          </a:lstStyle>
+          <a:p>
+            <a:pPr marL="15875" indent="0">
+              <a:buNone/>
+            </a:pPr>
+            <a:r>
+              <a:rPr lang="en-US" sz="1400" dirty="0" err="1"/>
+              <a:t>Uredimo</a:t>
+            </a:r>
+            <a:r>
+              <a:rPr lang="en-US" sz="1400" dirty="0"/>
+              <a:t> </a:t>
+            </a:r>
+            <a:r>
+              <a:rPr lang="en-US" sz="1400" dirty="0" err="1"/>
+              <a:t>strukturu</a:t>
+            </a:r>
+            <a:endParaRPr lang="en-US" sz="1400" dirty="0"/>
+          </a:p>
+        </p:txBody>
+      </p:sp>
+      <p:pic>
+        <p:nvPicPr>
+          <p:cNvPr id="5" name="Picture 4">
+            <a:extLst>
+              <a:ext uri="{FF2B5EF4-FFF2-40B4-BE49-F238E27FC236}">
+                <a16:creationId xmlns:a16="http://schemas.microsoft.com/office/drawing/2014/main" id="{497E69F2-B837-3548-7236-C0162C322ADF}"/>
+              </a:ext>
+            </a:extLst>
+          </p:cNvPr>
+          <p:cNvPicPr>
+            <a:picLocks noChangeAspect="1"/>
+          </p:cNvPicPr>
+          <p:nvPr/>
+        </p:nvPicPr>
+        <p:blipFill>
+          <a:blip r:embed="rId3"/>
+          <a:stretch>
+            <a:fillRect/>
+          </a:stretch>
+        </p:blipFill>
+        <p:spPr>
+          <a:xfrm>
+            <a:off x="1146995" y="1622322"/>
+            <a:ext cx="973425" cy="1069104"/>
+          </a:xfrm>
+          <a:prstGeom prst="rect">
+            <a:avLst/>
+          </a:prstGeom>
+        </p:spPr>
+      </p:pic>
+      <p:grpSp>
+        <p:nvGrpSpPr>
+          <p:cNvPr id="27" name="Group 26">
+            <a:extLst>
+              <a:ext uri="{FF2B5EF4-FFF2-40B4-BE49-F238E27FC236}">
+                <a16:creationId xmlns:a16="http://schemas.microsoft.com/office/drawing/2014/main" id="{69D00DE7-6BB1-ABA4-BA24-A4E75A17410B}"/>
+              </a:ext>
+            </a:extLst>
+          </p:cNvPr>
+          <p:cNvGrpSpPr/>
+          <p:nvPr/>
+        </p:nvGrpSpPr>
+        <p:grpSpPr>
+          <a:xfrm>
+            <a:off x="1146995" y="3223115"/>
+            <a:ext cx="3377826" cy="1111660"/>
+            <a:chOff x="1146995" y="3038168"/>
+            <a:chExt cx="3377826" cy="1111660"/>
+          </a:xfrm>
+        </p:grpSpPr>
+        <p:pic>
+          <p:nvPicPr>
+            <p:cNvPr id="7" name="Picture 6">
+              <a:extLst>
+                <a:ext uri="{FF2B5EF4-FFF2-40B4-BE49-F238E27FC236}">
+                  <a16:creationId xmlns:a16="http://schemas.microsoft.com/office/drawing/2014/main" id="{F65F448D-E094-C72D-165D-2670425E8DA1}"/>
+                </a:ext>
+              </a:extLst>
+            </p:cNvPr>
+            <p:cNvPicPr>
+              <a:picLocks noChangeAspect="1"/>
+            </p:cNvPicPr>
+            <p:nvPr/>
+          </p:nvPicPr>
+          <p:blipFill>
+            <a:blip r:embed="rId4"/>
+            <a:stretch>
+              <a:fillRect/>
+            </a:stretch>
+          </p:blipFill>
+          <p:spPr>
+            <a:xfrm>
+              <a:off x="3568188" y="3038168"/>
+              <a:ext cx="956633" cy="1111660"/>
+            </a:xfrm>
+            <a:prstGeom prst="rect">
+              <a:avLst/>
+            </a:prstGeom>
+          </p:spPr>
+        </p:pic>
+        <p:pic>
+          <p:nvPicPr>
+            <p:cNvPr id="10" name="Picture 9">
+              <a:extLst>
+                <a:ext uri="{FF2B5EF4-FFF2-40B4-BE49-F238E27FC236}">
+                  <a16:creationId xmlns:a16="http://schemas.microsoft.com/office/drawing/2014/main" id="{03B2D524-E318-079F-F431-490F13B2C7B7}"/>
+                </a:ext>
+              </a:extLst>
+            </p:cNvPr>
+            <p:cNvPicPr>
+              <a:picLocks noChangeAspect="1"/>
+            </p:cNvPicPr>
+            <p:nvPr/>
+          </p:nvPicPr>
+          <p:blipFill>
+            <a:blip r:embed="rId5"/>
+            <a:stretch>
+              <a:fillRect/>
+            </a:stretch>
+          </p:blipFill>
+          <p:spPr>
+            <a:xfrm>
+              <a:off x="1146995" y="3133289"/>
+              <a:ext cx="1914525" cy="921418"/>
+            </a:xfrm>
+            <a:prstGeom prst="rect">
+              <a:avLst/>
+            </a:prstGeom>
+          </p:spPr>
+        </p:pic>
+      </p:grpSp>
+      <p:grpSp>
+        <p:nvGrpSpPr>
+          <p:cNvPr id="28" name="Group 27">
+            <a:extLst>
+              <a:ext uri="{FF2B5EF4-FFF2-40B4-BE49-F238E27FC236}">
+                <a16:creationId xmlns:a16="http://schemas.microsoft.com/office/drawing/2014/main" id="{0B50AEB8-978B-2490-25BB-9CCE75420761}"/>
+              </a:ext>
+            </a:extLst>
+          </p:cNvPr>
+          <p:cNvGrpSpPr/>
+          <p:nvPr/>
+        </p:nvGrpSpPr>
+        <p:grpSpPr>
+          <a:xfrm>
+            <a:off x="6582152" y="3469910"/>
+            <a:ext cx="3377826" cy="1016807"/>
+            <a:chOff x="6660361" y="4464676"/>
+            <a:chExt cx="3377826" cy="1016807"/>
+          </a:xfrm>
+        </p:grpSpPr>
+        <p:pic>
+          <p:nvPicPr>
+            <p:cNvPr id="13" name="Picture 12">
+              <a:extLst>
+                <a:ext uri="{FF2B5EF4-FFF2-40B4-BE49-F238E27FC236}">
+                  <a16:creationId xmlns:a16="http://schemas.microsoft.com/office/drawing/2014/main" id="{8B8757F3-FAA9-BAC8-F6B2-BE1836E91611}"/>
+                </a:ext>
+              </a:extLst>
+            </p:cNvPr>
+            <p:cNvPicPr>
+              <a:picLocks noChangeAspect="1"/>
+            </p:cNvPicPr>
+            <p:nvPr/>
+          </p:nvPicPr>
+          <p:blipFill>
+            <a:blip r:embed="rId6"/>
+            <a:stretch>
+              <a:fillRect/>
+            </a:stretch>
+          </p:blipFill>
+          <p:spPr>
+            <a:xfrm>
+              <a:off x="9151916" y="4464676"/>
+              <a:ext cx="886271" cy="1016807"/>
+            </a:xfrm>
+            <a:prstGeom prst="rect">
+              <a:avLst/>
+            </a:prstGeom>
+          </p:spPr>
+        </p:pic>
+        <p:pic>
+          <p:nvPicPr>
+            <p:cNvPr id="16" name="Picture 15">
+              <a:extLst>
+                <a:ext uri="{FF2B5EF4-FFF2-40B4-BE49-F238E27FC236}">
+                  <a16:creationId xmlns:a16="http://schemas.microsoft.com/office/drawing/2014/main" id="{F1DB6581-39E9-1DA7-92DE-C9B762E9D6E6}"/>
+                </a:ext>
+              </a:extLst>
+            </p:cNvPr>
+            <p:cNvPicPr>
+              <a:picLocks noChangeAspect="1"/>
+            </p:cNvPicPr>
+            <p:nvPr/>
+          </p:nvPicPr>
+          <p:blipFill>
+            <a:blip r:embed="rId7"/>
+            <a:stretch>
+              <a:fillRect/>
+            </a:stretch>
+          </p:blipFill>
+          <p:spPr>
+            <a:xfrm>
+              <a:off x="6660361" y="4557186"/>
+              <a:ext cx="2161560" cy="867500"/>
+            </a:xfrm>
+            <a:prstGeom prst="rect">
+              <a:avLst/>
+            </a:prstGeom>
+          </p:spPr>
+        </p:pic>
+      </p:grpSp>
+      <p:grpSp>
+        <p:nvGrpSpPr>
+          <p:cNvPr id="29" name="Group 28">
+            <a:extLst>
+              <a:ext uri="{FF2B5EF4-FFF2-40B4-BE49-F238E27FC236}">
+                <a16:creationId xmlns:a16="http://schemas.microsoft.com/office/drawing/2014/main" id="{FD8EF1E7-0C79-DC68-EB2F-FC694F08DC56}"/>
+              </a:ext>
+            </a:extLst>
+          </p:cNvPr>
+          <p:cNvGrpSpPr/>
+          <p:nvPr/>
+        </p:nvGrpSpPr>
+        <p:grpSpPr>
+          <a:xfrm>
+            <a:off x="6582152" y="1445282"/>
+            <a:ext cx="3789787" cy="1753475"/>
+            <a:chOff x="6248400" y="1384422"/>
+            <a:chExt cx="3789787" cy="1753475"/>
+          </a:xfrm>
+        </p:grpSpPr>
+        <p:pic>
+          <p:nvPicPr>
+            <p:cNvPr id="18" name="Picture 17">
+              <a:extLst>
+                <a:ext uri="{FF2B5EF4-FFF2-40B4-BE49-F238E27FC236}">
+                  <a16:creationId xmlns:a16="http://schemas.microsoft.com/office/drawing/2014/main" id="{5BFDBAD2-815F-C55B-582F-63E7D18359AA}"/>
+                </a:ext>
+              </a:extLst>
+            </p:cNvPr>
+            <p:cNvPicPr>
+              <a:picLocks noChangeAspect="1"/>
+            </p:cNvPicPr>
+            <p:nvPr/>
+          </p:nvPicPr>
+          <p:blipFill>
+            <a:blip r:embed="rId8"/>
+            <a:stretch>
+              <a:fillRect/>
+            </a:stretch>
+          </p:blipFill>
+          <p:spPr>
+            <a:xfrm>
+              <a:off x="6248400" y="1840523"/>
+              <a:ext cx="2027289" cy="850903"/>
+            </a:xfrm>
+            <a:prstGeom prst="rect">
+              <a:avLst/>
+            </a:prstGeom>
+          </p:spPr>
+        </p:pic>
+        <p:pic>
+          <p:nvPicPr>
+            <p:cNvPr id="22" name="Picture 21">
+              <a:extLst>
+                <a:ext uri="{FF2B5EF4-FFF2-40B4-BE49-F238E27FC236}">
+                  <a16:creationId xmlns:a16="http://schemas.microsoft.com/office/drawing/2014/main" id="{C97C24E0-8A27-B1A8-DAA1-A091D20D6225}"/>
+                </a:ext>
+              </a:extLst>
+            </p:cNvPr>
+            <p:cNvPicPr>
+              <a:picLocks noChangeAspect="1"/>
+            </p:cNvPicPr>
+            <p:nvPr/>
+          </p:nvPicPr>
+          <p:blipFill>
+            <a:blip r:embed="rId9"/>
+            <a:stretch>
+              <a:fillRect/>
+            </a:stretch>
+          </p:blipFill>
+          <p:spPr>
+            <a:xfrm>
+              <a:off x="8749527" y="1384422"/>
+              <a:ext cx="1288660" cy="1753475"/>
+            </a:xfrm>
+            <a:prstGeom prst="rect">
+              <a:avLst/>
+            </a:prstGeom>
+          </p:spPr>
+        </p:pic>
+      </p:grpSp>
+      <p:sp>
+        <p:nvSpPr>
+          <p:cNvPr id="23" name="Content Placeholder 2">
+            <a:extLst>
+              <a:ext uri="{FF2B5EF4-FFF2-40B4-BE49-F238E27FC236}">
+                <a16:creationId xmlns:a16="http://schemas.microsoft.com/office/drawing/2014/main" id="{B56F8366-E62A-042D-04B1-DA172A8C9309}"/>
+              </a:ext>
+            </a:extLst>
+          </p:cNvPr>
+          <p:cNvSpPr txBox="1">
+            <a:spLocks/>
+          </p:cNvSpPr>
+          <p:nvPr/>
+        </p:nvSpPr>
+        <p:spPr>
+          <a:xfrm>
+            <a:off x="1086874" y="3038167"/>
+            <a:ext cx="1974646" cy="369895"/>
+          </a:xfrm>
+          <a:prstGeom prst="rect">
+            <a:avLst/>
+          </a:prstGeom>
+        </p:spPr>
+        <p:txBody>
+          <a:bodyPr vert="horz" lIns="91440" tIns="45720" rIns="91440" bIns="45720" rtlCol="0">
+            <a:noAutofit/>
+          </a:bodyPr>
+          <a:lstStyle>
+            <a:lvl1pPr marL="368300" indent="-352425" algn="l" defTabSz="914400" rtl="0" eaLnBrk="1" latinLnBrk="0" hangingPunct="1">
+              <a:lnSpc>
+                <a:spcPct val="90000"/>
+              </a:lnSpc>
+              <a:spcBef>
+                <a:spcPts val="600"/>
+              </a:spcBef>
+              <a:spcAft>
+                <a:spcPts val="600"/>
+              </a:spcAft>
+              <a:buClr>
+                <a:schemeClr val="accent2"/>
+              </a:buClr>
+              <a:buFont typeface="Wingdings" pitchFamily="2" charset="2"/>
+              <a:buChar char="§"/>
+              <a:tabLst/>
+              <a:defRPr sz="2400" kern="1200">
+                <a:solidFill>
+                  <a:schemeClr val="tx1"/>
+                </a:solidFill>
+                <a:latin typeface="+mn-lt"/>
+                <a:ea typeface="Open Sans" panose="020B0606030504020204" pitchFamily="34" charset="0"/>
+                <a:cs typeface="Open Sans" panose="020B0606030504020204" pitchFamily="34" charset="0"/>
+              </a:defRPr>
+            </a:lvl1pPr>
+            <a:lvl2pPr marL="771525" indent="-274638" algn="l" defTabSz="914400" rtl="0" eaLnBrk="1" latinLnBrk="0" hangingPunct="1">
+              <a:lnSpc>
+                <a:spcPct val="90000"/>
+              </a:lnSpc>
+              <a:spcBef>
+                <a:spcPts val="600"/>
+              </a:spcBef>
+              <a:spcAft>
+                <a:spcPts val="600"/>
+              </a:spcAft>
+              <a:buClr>
+                <a:schemeClr val="accent2"/>
+              </a:buClr>
+              <a:buFont typeface="Wingdings" pitchFamily="2" charset="2"/>
+              <a:buChar char="§"/>
+              <a:tabLst/>
+              <a:defRPr sz="2200" kern="1200">
+                <a:solidFill>
+                  <a:schemeClr val="tx1"/>
+                </a:solidFill>
+                <a:latin typeface="+mn-lt"/>
+                <a:ea typeface="Open Sans" panose="020B0606030504020204" pitchFamily="34" charset="0"/>
+                <a:cs typeface="Open Sans" panose="020B0606030504020204" pitchFamily="34" charset="0"/>
+              </a:defRPr>
+            </a:lvl2pPr>
+            <a:lvl3pPr marL="1143000" indent="-228600" algn="l" defTabSz="914400" rtl="0" eaLnBrk="1" latinLnBrk="0" hangingPunct="1">
+              <a:lnSpc>
+                <a:spcPct val="90000"/>
+              </a:lnSpc>
+              <a:spcBef>
+                <a:spcPts val="600"/>
+              </a:spcBef>
+              <a:spcAft>
+                <a:spcPts val="600"/>
+              </a:spcAft>
+              <a:buClr>
+                <a:schemeClr val="accent2"/>
+              </a:buClr>
+              <a:buFont typeface="Wingdings" pitchFamily="2" charset="2"/>
+              <a:buChar char="§"/>
+              <a:defRPr sz="2000" kern="1200">
+                <a:solidFill>
+                  <a:schemeClr val="tx1"/>
+                </a:solidFill>
+                <a:latin typeface="+mn-lt"/>
+                <a:ea typeface="Open Sans" panose="020B0606030504020204" pitchFamily="34" charset="0"/>
+                <a:cs typeface="Open Sans" panose="020B0606030504020204" pitchFamily="34" charset="0"/>
+              </a:defRPr>
+            </a:lvl3pPr>
+            <a:lvl4pPr marL="1600200" indent="-228600" algn="l" defTabSz="914400" rtl="0" eaLnBrk="1" latinLnBrk="0" hangingPunct="1">
+              <a:lnSpc>
+                <a:spcPct val="90000"/>
+              </a:lnSpc>
+              <a:spcBef>
+                <a:spcPts val="600"/>
+              </a:spcBef>
+              <a:spcAft>
+                <a:spcPts val="600"/>
+              </a:spcAft>
+              <a:buClr>
+                <a:schemeClr val="accent2"/>
+              </a:buClr>
+              <a:buFont typeface="Wingdings" pitchFamily="2" charset="2"/>
+              <a:buChar char="§"/>
+              <a:defRPr sz="1800" kern="1200">
+                <a:solidFill>
+                  <a:schemeClr val="tx1"/>
+                </a:solidFill>
+                <a:latin typeface="+mn-lt"/>
+                <a:ea typeface="Open Sans" panose="020B0606030504020204" pitchFamily="34" charset="0"/>
+                <a:cs typeface="Open Sans" panose="020B0606030504020204" pitchFamily="34" charset="0"/>
+              </a:defRPr>
+            </a:lvl4pPr>
+            <a:lvl5pPr marL="1960563" indent="-225425" algn="l" defTabSz="914400" rtl="0" eaLnBrk="1" latinLnBrk="0" hangingPunct="1">
+              <a:lnSpc>
+                <a:spcPct val="90000"/>
+              </a:lnSpc>
+              <a:spcBef>
+                <a:spcPts val="600"/>
+              </a:spcBef>
+              <a:spcAft>
+                <a:spcPts val="600"/>
+              </a:spcAft>
+              <a:buClr>
+                <a:schemeClr val="accent2"/>
+              </a:buClr>
+              <a:buFont typeface="Wingdings" pitchFamily="2" charset="2"/>
+              <a:buChar char="§"/>
+              <a:tabLst/>
+              <a:defRPr sz="1600" kern="1200">
+                <a:solidFill>
+                  <a:schemeClr val="tx1"/>
+                </a:solidFill>
+                <a:latin typeface="+mn-lt"/>
+                <a:ea typeface="Open Sans" panose="020B0606030504020204" pitchFamily="34" charset="0"/>
+                <a:cs typeface="Open Sans" panose="020B0606030504020204" pitchFamily="34" charset="0"/>
+              </a:defRPr>
+            </a:lvl5pPr>
+            <a:lvl6pPr marL="2514600" indent="-228600" algn="l" defTabSz="914400" rtl="0" eaLnBrk="1" latinLnBrk="0" hangingPunct="1">
+              <a:lnSpc>
+                <a:spcPct val="90000"/>
+              </a:lnSpc>
+              <a:spcBef>
+                <a:spcPts val="500"/>
+              </a:spcBef>
+              <a:buFont typeface="Arial" panose="020B0604020202020204" pitchFamily="34" charset="0"/>
+              <a:buChar char="•"/>
+              <a:defRPr sz="1800" kern="1200">
+                <a:solidFill>
+                  <a:schemeClr val="tx1"/>
+                </a:solidFill>
+                <a:latin typeface="+mn-lt"/>
+                <a:ea typeface="+mn-ea"/>
+                <a:cs typeface="+mn-cs"/>
+              </a:defRPr>
+            </a:lvl6pPr>
+            <a:lvl7pPr marL="2971800" indent="-228600" algn="l" defTabSz="914400" rtl="0" eaLnBrk="1" latinLnBrk="0" hangingPunct="1">
+              <a:lnSpc>
+                <a:spcPct val="90000"/>
+              </a:lnSpc>
+              <a:spcBef>
+                <a:spcPts val="500"/>
+              </a:spcBef>
+              <a:buFont typeface="Arial" panose="020B0604020202020204" pitchFamily="34" charset="0"/>
+              <a:buChar char="•"/>
+              <a:defRPr sz="1800" kern="1200">
+                <a:solidFill>
+                  <a:schemeClr val="tx1"/>
+                </a:solidFill>
+                <a:latin typeface="+mn-lt"/>
+                <a:ea typeface="+mn-ea"/>
+                <a:cs typeface="+mn-cs"/>
+              </a:defRPr>
+            </a:lvl7pPr>
+            <a:lvl8pPr marL="3429000" indent="-228600" algn="l" defTabSz="914400" rtl="0" eaLnBrk="1" latinLnBrk="0" hangingPunct="1">
+              <a:lnSpc>
+                <a:spcPct val="90000"/>
+              </a:lnSpc>
+              <a:spcBef>
+                <a:spcPts val="500"/>
+              </a:spcBef>
+              <a:buFont typeface="Arial" panose="020B0604020202020204" pitchFamily="34" charset="0"/>
+              <a:buChar char="•"/>
+              <a:defRPr sz="1800" kern="1200">
+                <a:solidFill>
+                  <a:schemeClr val="tx1"/>
+                </a:solidFill>
+                <a:latin typeface="+mn-lt"/>
+                <a:ea typeface="+mn-ea"/>
+                <a:cs typeface="+mn-cs"/>
+              </a:defRPr>
+            </a:lvl8pPr>
+            <a:lvl9pPr marL="3886200" indent="-228600" algn="l" defTabSz="914400" rtl="0" eaLnBrk="1" latinLnBrk="0" hangingPunct="1">
+              <a:lnSpc>
+                <a:spcPct val="90000"/>
+              </a:lnSpc>
+              <a:spcBef>
+                <a:spcPts val="500"/>
+              </a:spcBef>
+              <a:buFont typeface="Arial" panose="020B0604020202020204" pitchFamily="34" charset="0"/>
+              <a:buChar char="•"/>
+              <a:defRPr sz="1800" kern="1200">
+                <a:solidFill>
+                  <a:schemeClr val="tx1"/>
+                </a:solidFill>
+                <a:latin typeface="+mn-lt"/>
+                <a:ea typeface="+mn-ea"/>
+                <a:cs typeface="+mn-cs"/>
+              </a:defRPr>
+            </a:lvl9pPr>
+          </a:lstStyle>
+          <a:p>
+            <a:pPr marL="15875" indent="0">
+              <a:buNone/>
+            </a:pPr>
+            <a:r>
+              <a:rPr lang="en-US" sz="1400" dirty="0"/>
+              <a:t>UPDATE (PUT)</a:t>
+            </a:r>
+          </a:p>
+        </p:txBody>
+      </p:sp>
+      <p:sp>
+        <p:nvSpPr>
+          <p:cNvPr id="30" name="Content Placeholder 2">
+            <a:extLst>
+              <a:ext uri="{FF2B5EF4-FFF2-40B4-BE49-F238E27FC236}">
+                <a16:creationId xmlns:a16="http://schemas.microsoft.com/office/drawing/2014/main" id="{9EE4A228-A0D8-7340-F7CE-CEAA64B1583C}"/>
+              </a:ext>
+            </a:extLst>
+          </p:cNvPr>
+          <p:cNvSpPr txBox="1">
+            <a:spLocks/>
+          </p:cNvSpPr>
+          <p:nvPr/>
+        </p:nvSpPr>
+        <p:spPr>
+          <a:xfrm>
+            <a:off x="6502400" y="1260335"/>
+            <a:ext cx="1974646" cy="369895"/>
+          </a:xfrm>
+          <a:prstGeom prst="rect">
+            <a:avLst/>
+          </a:prstGeom>
+        </p:spPr>
+        <p:txBody>
+          <a:bodyPr vert="horz" lIns="91440" tIns="45720" rIns="91440" bIns="45720" rtlCol="0">
+            <a:noAutofit/>
+          </a:bodyPr>
+          <a:lstStyle>
+            <a:lvl1pPr marL="368300" indent="-352425" algn="l" defTabSz="914400" rtl="0" eaLnBrk="1" latinLnBrk="0" hangingPunct="1">
+              <a:lnSpc>
+                <a:spcPct val="90000"/>
+              </a:lnSpc>
+              <a:spcBef>
+                <a:spcPts val="600"/>
+              </a:spcBef>
+              <a:spcAft>
+                <a:spcPts val="600"/>
+              </a:spcAft>
+              <a:buClr>
+                <a:schemeClr val="accent2"/>
+              </a:buClr>
+              <a:buFont typeface="Wingdings" pitchFamily="2" charset="2"/>
+              <a:buChar char="§"/>
+              <a:tabLst/>
+              <a:defRPr sz="2400" kern="1200">
+                <a:solidFill>
+                  <a:schemeClr val="tx1"/>
+                </a:solidFill>
+                <a:latin typeface="+mn-lt"/>
+                <a:ea typeface="Open Sans" panose="020B0606030504020204" pitchFamily="34" charset="0"/>
+                <a:cs typeface="Open Sans" panose="020B0606030504020204" pitchFamily="34" charset="0"/>
+              </a:defRPr>
+            </a:lvl1pPr>
+            <a:lvl2pPr marL="771525" indent="-274638" algn="l" defTabSz="914400" rtl="0" eaLnBrk="1" latinLnBrk="0" hangingPunct="1">
+              <a:lnSpc>
+                <a:spcPct val="90000"/>
+              </a:lnSpc>
+              <a:spcBef>
+                <a:spcPts val="600"/>
+              </a:spcBef>
+              <a:spcAft>
+                <a:spcPts val="600"/>
+              </a:spcAft>
+              <a:buClr>
+                <a:schemeClr val="accent2"/>
+              </a:buClr>
+              <a:buFont typeface="Wingdings" pitchFamily="2" charset="2"/>
+              <a:buChar char="§"/>
+              <a:tabLst/>
+              <a:defRPr sz="2200" kern="1200">
+                <a:solidFill>
+                  <a:schemeClr val="tx1"/>
+                </a:solidFill>
+                <a:latin typeface="+mn-lt"/>
+                <a:ea typeface="Open Sans" panose="020B0606030504020204" pitchFamily="34" charset="0"/>
+                <a:cs typeface="Open Sans" panose="020B0606030504020204" pitchFamily="34" charset="0"/>
+              </a:defRPr>
+            </a:lvl2pPr>
+            <a:lvl3pPr marL="1143000" indent="-228600" algn="l" defTabSz="914400" rtl="0" eaLnBrk="1" latinLnBrk="0" hangingPunct="1">
+              <a:lnSpc>
+                <a:spcPct val="90000"/>
+              </a:lnSpc>
+              <a:spcBef>
+                <a:spcPts val="600"/>
+              </a:spcBef>
+              <a:spcAft>
+                <a:spcPts val="600"/>
+              </a:spcAft>
+              <a:buClr>
+                <a:schemeClr val="accent2"/>
+              </a:buClr>
+              <a:buFont typeface="Wingdings" pitchFamily="2" charset="2"/>
+              <a:buChar char="§"/>
+              <a:defRPr sz="2000" kern="1200">
+                <a:solidFill>
+                  <a:schemeClr val="tx1"/>
+                </a:solidFill>
+                <a:latin typeface="+mn-lt"/>
+                <a:ea typeface="Open Sans" panose="020B0606030504020204" pitchFamily="34" charset="0"/>
+                <a:cs typeface="Open Sans" panose="020B0606030504020204" pitchFamily="34" charset="0"/>
+              </a:defRPr>
+            </a:lvl3pPr>
+            <a:lvl4pPr marL="1600200" indent="-228600" algn="l" defTabSz="914400" rtl="0" eaLnBrk="1" latinLnBrk="0" hangingPunct="1">
+              <a:lnSpc>
+                <a:spcPct val="90000"/>
+              </a:lnSpc>
+              <a:spcBef>
+                <a:spcPts val="600"/>
+              </a:spcBef>
+              <a:spcAft>
+                <a:spcPts val="600"/>
+              </a:spcAft>
+              <a:buClr>
+                <a:schemeClr val="accent2"/>
+              </a:buClr>
+              <a:buFont typeface="Wingdings" pitchFamily="2" charset="2"/>
+              <a:buChar char="§"/>
+              <a:defRPr sz="1800" kern="1200">
+                <a:solidFill>
+                  <a:schemeClr val="tx1"/>
+                </a:solidFill>
+                <a:latin typeface="+mn-lt"/>
+                <a:ea typeface="Open Sans" panose="020B0606030504020204" pitchFamily="34" charset="0"/>
+                <a:cs typeface="Open Sans" panose="020B0606030504020204" pitchFamily="34" charset="0"/>
+              </a:defRPr>
+            </a:lvl4pPr>
+            <a:lvl5pPr marL="1960563" indent="-225425" algn="l" defTabSz="914400" rtl="0" eaLnBrk="1" latinLnBrk="0" hangingPunct="1">
+              <a:lnSpc>
+                <a:spcPct val="90000"/>
+              </a:lnSpc>
+              <a:spcBef>
+                <a:spcPts val="600"/>
+              </a:spcBef>
+              <a:spcAft>
+                <a:spcPts val="600"/>
+              </a:spcAft>
+              <a:buClr>
+                <a:schemeClr val="accent2"/>
+              </a:buClr>
+              <a:buFont typeface="Wingdings" pitchFamily="2" charset="2"/>
+              <a:buChar char="§"/>
+              <a:tabLst/>
+              <a:defRPr sz="1600" kern="1200">
+                <a:solidFill>
+                  <a:schemeClr val="tx1"/>
+                </a:solidFill>
+                <a:latin typeface="+mn-lt"/>
+                <a:ea typeface="Open Sans" panose="020B0606030504020204" pitchFamily="34" charset="0"/>
+                <a:cs typeface="Open Sans" panose="020B0606030504020204" pitchFamily="34" charset="0"/>
+              </a:defRPr>
+            </a:lvl5pPr>
+            <a:lvl6pPr marL="2514600" indent="-228600" algn="l" defTabSz="914400" rtl="0" eaLnBrk="1" latinLnBrk="0" hangingPunct="1">
+              <a:lnSpc>
+                <a:spcPct val="90000"/>
+              </a:lnSpc>
+              <a:spcBef>
+                <a:spcPts val="500"/>
+              </a:spcBef>
+              <a:buFont typeface="Arial" panose="020B0604020202020204" pitchFamily="34" charset="0"/>
+              <a:buChar char="•"/>
+              <a:defRPr sz="1800" kern="1200">
+                <a:solidFill>
+                  <a:schemeClr val="tx1"/>
+                </a:solidFill>
+                <a:latin typeface="+mn-lt"/>
+                <a:ea typeface="+mn-ea"/>
+                <a:cs typeface="+mn-cs"/>
+              </a:defRPr>
+            </a:lvl6pPr>
+            <a:lvl7pPr marL="2971800" indent="-228600" algn="l" defTabSz="914400" rtl="0" eaLnBrk="1" latinLnBrk="0" hangingPunct="1">
+              <a:lnSpc>
+                <a:spcPct val="90000"/>
+              </a:lnSpc>
+              <a:spcBef>
+                <a:spcPts val="500"/>
+              </a:spcBef>
+              <a:buFont typeface="Arial" panose="020B0604020202020204" pitchFamily="34" charset="0"/>
+              <a:buChar char="•"/>
+              <a:defRPr sz="1800" kern="1200">
+                <a:solidFill>
+                  <a:schemeClr val="tx1"/>
+                </a:solidFill>
+                <a:latin typeface="+mn-lt"/>
+                <a:ea typeface="+mn-ea"/>
+                <a:cs typeface="+mn-cs"/>
+              </a:defRPr>
+            </a:lvl7pPr>
+            <a:lvl8pPr marL="3429000" indent="-228600" algn="l" defTabSz="914400" rtl="0" eaLnBrk="1" latinLnBrk="0" hangingPunct="1">
+              <a:lnSpc>
+                <a:spcPct val="90000"/>
+              </a:lnSpc>
+              <a:spcBef>
+                <a:spcPts val="500"/>
+              </a:spcBef>
+              <a:buFont typeface="Arial" panose="020B0604020202020204" pitchFamily="34" charset="0"/>
+              <a:buChar char="•"/>
+              <a:defRPr sz="1800" kern="1200">
+                <a:solidFill>
+                  <a:schemeClr val="tx1"/>
+                </a:solidFill>
+                <a:latin typeface="+mn-lt"/>
+                <a:ea typeface="+mn-ea"/>
+                <a:cs typeface="+mn-cs"/>
+              </a:defRPr>
+            </a:lvl8pPr>
+            <a:lvl9pPr marL="3886200" indent="-228600" algn="l" defTabSz="914400" rtl="0" eaLnBrk="1" latinLnBrk="0" hangingPunct="1">
+              <a:lnSpc>
+                <a:spcPct val="90000"/>
+              </a:lnSpc>
+              <a:spcBef>
+                <a:spcPts val="500"/>
+              </a:spcBef>
+              <a:buFont typeface="Arial" panose="020B0604020202020204" pitchFamily="34" charset="0"/>
+              <a:buChar char="•"/>
+              <a:defRPr sz="1800" kern="1200">
+                <a:solidFill>
+                  <a:schemeClr val="tx1"/>
+                </a:solidFill>
+                <a:latin typeface="+mn-lt"/>
+                <a:ea typeface="+mn-ea"/>
+                <a:cs typeface="+mn-cs"/>
+              </a:defRPr>
+            </a:lvl9pPr>
+          </a:lstStyle>
+          <a:p>
+            <a:pPr marL="15875" indent="0">
+              <a:buNone/>
+            </a:pPr>
+            <a:r>
+              <a:rPr lang="en-US" sz="1400" dirty="0"/>
+              <a:t>DELETE</a:t>
+            </a:r>
+          </a:p>
+        </p:txBody>
+      </p:sp>
+    </p:spTree>
+    <p:extLst>
+      <p:ext uri="{BB962C8B-B14F-4D97-AF65-F5344CB8AC3E}">
+        <p14:creationId xmlns:p14="http://schemas.microsoft.com/office/powerpoint/2010/main" val="1011301594"/>
       </p:ext>
     </p:extLst>
   </p:cSld>
@@ -21693,17 +22881,6 @@
 </file>
 
 <file path=customXml/item1.xml><?xml version="1.0" encoding="utf-8"?>
-<p:properties xmlns:p="http://schemas.microsoft.com/office/2006/metadata/properties" xmlns:xsi="http://www.w3.org/2001/XMLSchema-instance" xmlns:pc="http://schemas.microsoft.com/office/infopath/2007/PartnerControls">
-  <documentManagement>
-    <lcf76f155ced4ddcb4097134ff3c332f xmlns="40806f44-bc4a-4ea4-b660-c6da93f8f179">
-      <Terms xmlns="http://schemas.microsoft.com/office/infopath/2007/PartnerControls"/>
-    </lcf76f155ced4ddcb4097134ff3c332f>
-    <TaxCatchAll xmlns="758d0d8f-b783-4c78-ab73-9740c97b97cf" xsi:nil="true"/>
-  </documentManagement>
-</p:properties>
-</file>
-
-<file path=customXml/item2.xml><?xml version="1.0" encoding="utf-8"?>
 <ct:contentTypeSchema xmlns:ct="http://schemas.microsoft.com/office/2006/metadata/contentType" xmlns:ma="http://schemas.microsoft.com/office/2006/metadata/properties/metaAttributes" ct:_="" ma:_="" ma:contentTypeName="Document" ma:contentTypeID="0x010100E4F55D9EF0BF0A44B819E681FCAC00B7" ma:contentTypeVersion="12" ma:contentTypeDescription="Create a new document." ma:contentTypeScope="" ma:versionID="068ce121a7a7a0aebcb89dd601c4f0a2">
   <xsd:schema xmlns:xsd="http://www.w3.org/2001/XMLSchema" xmlns:xs="http://www.w3.org/2001/XMLSchema" xmlns:p="http://schemas.microsoft.com/office/2006/metadata/properties" xmlns:ns2="40806f44-bc4a-4ea4-b660-c6da93f8f179" xmlns:ns3="758d0d8f-b783-4c78-ab73-9740c97b97cf" targetNamespace="http://schemas.microsoft.com/office/2006/metadata/properties" ma:root="true" ma:fieldsID="67c58e6c5c8ea9af0822acd84d25e1a2" ns2:_="" ns3:_="">
     <xsd:import namespace="40806f44-bc4a-4ea4-b660-c6da93f8f179"/>
@@ -21920,6 +23097,17 @@
 </ct:contentTypeSchema>
 </file>
 
+<file path=customXml/item2.xml><?xml version="1.0" encoding="utf-8"?>
+<p:properties xmlns:p="http://schemas.microsoft.com/office/2006/metadata/properties" xmlns:xsi="http://www.w3.org/2001/XMLSchema-instance" xmlns:pc="http://schemas.microsoft.com/office/infopath/2007/PartnerControls">
+  <documentManagement>
+    <lcf76f155ced4ddcb4097134ff3c332f xmlns="40806f44-bc4a-4ea4-b660-c6da93f8f179">
+      <Terms xmlns="http://schemas.microsoft.com/office/infopath/2007/PartnerControls"/>
+    </lcf76f155ced4ddcb4097134ff3c332f>
+    <TaxCatchAll xmlns="758d0d8f-b783-4c78-ab73-9740c97b97cf" xsi:nil="true"/>
+  </documentManagement>
+</p:properties>
+</file>
+
 <file path=customXml/item3.xml><?xml version="1.0" encoding="utf-8"?>
 <?mso-contentType ?>
 <FormTemplates xmlns="http://schemas.microsoft.com/sharepoint/v3/contenttype/forms">
@@ -21930,23 +23118,6 @@
 </file>
 
 <file path=customXml/itemProps1.xml><?xml version="1.0" encoding="utf-8"?>
-<ds:datastoreItem xmlns:ds="http://schemas.openxmlformats.org/officeDocument/2006/customXml" ds:itemID="{61E72F81-8533-461E-8E71-A6D77294CFEF}">
-  <ds:schemaRefs>
-    <ds:schemaRef ds:uri="http://purl.org/dc/elements/1.1/"/>
-    <ds:schemaRef ds:uri="http://www.w3.org/XML/1998/namespace"/>
-    <ds:schemaRef ds:uri="http://purl.org/dc/terms/"/>
-    <ds:schemaRef ds:uri="http://schemas.microsoft.com/office/2006/documentManagement/types"/>
-    <ds:schemaRef ds:uri="40806f44-bc4a-4ea4-b660-c6da93f8f179"/>
-    <ds:schemaRef ds:uri="http://schemas.openxmlformats.org/package/2006/metadata/core-properties"/>
-    <ds:schemaRef ds:uri="http://purl.org/dc/dcmitype/"/>
-    <ds:schemaRef ds:uri="http://schemas.microsoft.com/office/infopath/2007/PartnerControls"/>
-    <ds:schemaRef ds:uri="758d0d8f-b783-4c78-ab73-9740c97b97cf"/>
-    <ds:schemaRef ds:uri="http://schemas.microsoft.com/office/2006/metadata/properties"/>
-  </ds:schemaRefs>
-</ds:datastoreItem>
-</file>
-
-<file path=customXml/itemProps2.xml><?xml version="1.0" encoding="utf-8"?>
 <ds:datastoreItem xmlns:ds="http://schemas.openxmlformats.org/officeDocument/2006/customXml" ds:itemID="{4E6AED0F-96FF-4C7F-8AC9-672C91BFCDFE}">
   <ds:schemaRefs>
     <ds:schemaRef ds:uri="http://schemas.microsoft.com/office/2006/metadata/contentType"/>
@@ -21965,6 +23136,23 @@
 </ds:datastoreItem>
 </file>
 
+<file path=customXml/itemProps2.xml><?xml version="1.0" encoding="utf-8"?>
+<ds:datastoreItem xmlns:ds="http://schemas.openxmlformats.org/officeDocument/2006/customXml" ds:itemID="{61E72F81-8533-461E-8E71-A6D77294CFEF}">
+  <ds:schemaRefs>
+    <ds:schemaRef ds:uri="http://purl.org/dc/elements/1.1/"/>
+    <ds:schemaRef ds:uri="http://www.w3.org/XML/1998/namespace"/>
+    <ds:schemaRef ds:uri="http://purl.org/dc/terms/"/>
+    <ds:schemaRef ds:uri="http://schemas.microsoft.com/office/2006/documentManagement/types"/>
+    <ds:schemaRef ds:uri="40806f44-bc4a-4ea4-b660-c6da93f8f179"/>
+    <ds:schemaRef ds:uri="http://schemas.openxmlformats.org/package/2006/metadata/core-properties"/>
+    <ds:schemaRef ds:uri="http://purl.org/dc/dcmitype/"/>
+    <ds:schemaRef ds:uri="http://schemas.microsoft.com/office/infopath/2007/PartnerControls"/>
+    <ds:schemaRef ds:uri="758d0d8f-b783-4c78-ab73-9740c97b97cf"/>
+    <ds:schemaRef ds:uri="http://schemas.microsoft.com/office/2006/metadata/properties"/>
+  </ds:schemaRefs>
+</ds:datastoreItem>
+</file>
+
 <file path=customXml/itemProps3.xml><?xml version="1.0" encoding="utf-8"?>
 <ds:datastoreItem xmlns:ds="http://schemas.openxmlformats.org/officeDocument/2006/customXml" ds:itemID="{46915D30-CAA6-465E-907F-1770D4E3B01D}">
   <ds:schemaRefs>

</xml_diff>